<commit_message>
output adjustments + register client
</commit_message>
<xml_diff>
--- a/01606423_01610246.pptx
+++ b/01606423_01610246.pptx
@@ -919,6 +919,91 @@
 </p:notesMaster>
 </file>
 
+<file path=ppt/notesSlides/notesSlide1.xml><?xml version="1.0" encoding="utf-8"?>
+<p:notes xmlns:a="http://schemas.openxmlformats.org/drawingml/2006/main" xmlns:r="http://schemas.openxmlformats.org/officeDocument/2006/relationships" xmlns:p="http://schemas.openxmlformats.org/presentationml/2006/main">
+  <p:cSld>
+    <p:spTree>
+      <p:nvGrpSpPr>
+        <p:cNvPr id="1" name=""/>
+        <p:cNvGrpSpPr/>
+        <p:nvPr/>
+      </p:nvGrpSpPr>
+      <p:grpSpPr>
+        <a:xfrm>
+          <a:off x="0" y="0"/>
+          <a:ext cx="0" cy="0"/>
+          <a:chOff x="0" y="0"/>
+          <a:chExt cx="0" cy="0"/>
+        </a:xfrm>
+      </p:grpSpPr>
+      <p:sp>
+        <p:nvSpPr>
+          <p:cNvPr id="2" name="Slide Image Placeholder 1"/>
+          <p:cNvSpPr>
+            <a:spLocks noGrp="1" noRot="1" noChangeAspect="1"/>
+          </p:cNvSpPr>
+          <p:nvPr>
+            <p:ph type="sldImg"/>
+          </p:nvPr>
+        </p:nvSpPr>
+        <p:spPr/>
+      </p:sp>
+      <p:sp>
+        <p:nvSpPr>
+          <p:cNvPr id="3" name="Notes Placeholder 2"/>
+          <p:cNvSpPr>
+            <a:spLocks noGrp="1"/>
+          </p:cNvSpPr>
+          <p:nvPr>
+            <p:ph type="body" idx="1"/>
+          </p:nvPr>
+        </p:nvSpPr>
+        <p:spPr/>
+        <p:txBody>
+          <a:bodyPr/>
+          <a:lstStyle/>
+          <a:p>
+            <a:endParaRPr lang="en-AT" dirty="0"/>
+          </a:p>
+        </p:txBody>
+      </p:sp>
+      <p:sp>
+        <p:nvSpPr>
+          <p:cNvPr id="4" name="Slide Number Placeholder 3"/>
+          <p:cNvSpPr>
+            <a:spLocks noGrp="1"/>
+          </p:cNvSpPr>
+          <p:nvPr>
+            <p:ph type="sldNum" sz="quarter" idx="5"/>
+          </p:nvPr>
+        </p:nvSpPr>
+        <p:spPr/>
+        <p:txBody>
+          <a:bodyPr/>
+          <a:lstStyle/>
+          <a:p>
+            <a:fld id="{D6CCA694-25A8-4CE8-8B05-F744047ED62E}" type="slidenum">
+              <a:rPr lang="de-DE" altLang="de-DE" smtClean="0"/>
+              <a:pPr/>
+              <a:t>7</a:t>
+            </a:fld>
+            <a:endParaRPr lang="de-DE" altLang="de-DE"/>
+          </a:p>
+        </p:txBody>
+      </p:sp>
+    </p:spTree>
+    <p:extLst>
+      <p:ext uri="{BB962C8B-B14F-4D97-AF65-F5344CB8AC3E}">
+        <p14:creationId xmlns:p14="http://schemas.microsoft.com/office/powerpoint/2010/main" val="2475951165"/>
+      </p:ext>
+    </p:extLst>
+  </p:cSld>
+  <p:clrMapOvr>
+    <a:masterClrMapping/>
+  </p:clrMapOvr>
+</p:notes>
+</file>
+
 <file path=ppt/slideLayouts/slideLayout1.xml><?xml version="1.0" encoding="utf-8"?>
 <p:sldLayout xmlns:a="http://schemas.openxmlformats.org/drawingml/2006/main" xmlns:r="http://schemas.openxmlformats.org/officeDocument/2006/relationships" xmlns:p="http://schemas.openxmlformats.org/presentationml/2006/main" type="title" preserve="1">
   <p:cSld name="Title Slide">
@@ -4529,59 +4614,118 @@
           <a:lstStyle/>
           <a:p>
             <a:r>
-              <a:rPr lang="en-GB" dirty="0"/>
-              <a:t>p</a:t>
-            </a:r>
-            <a:r>
-              <a:rPr lang="en-AT" dirty="0"/>
-              <a:t>ersonal</a:t>
+              <a:rPr lang="de-AT" dirty="0" err="1"/>
+              <a:t>How</a:t>
+            </a:r>
+            <a:r>
+              <a:rPr lang="de-AT" dirty="0"/>
+              <a:t> </a:t>
+            </a:r>
+            <a:r>
+              <a:rPr lang="de-AT" dirty="0" err="1"/>
+              <a:t>to</a:t>
+            </a:r>
+            <a:r>
+              <a:rPr lang="de-AT" dirty="0"/>
+              <a:t> </a:t>
+            </a:r>
+            <a:r>
+              <a:rPr lang="de-AT" dirty="0" err="1"/>
+              <a:t>protect</a:t>
+            </a:r>
+            <a:r>
+              <a:rPr lang="de-AT" dirty="0"/>
+              <a:t> </a:t>
+            </a:r>
+            <a:r>
+              <a:rPr lang="de-AT" dirty="0" err="1"/>
+              <a:t>key</a:t>
+            </a:r>
+            <a:r>
+              <a:rPr lang="de-AT" dirty="0"/>
+              <a:t>?</a:t>
             </a:r>
           </a:p>
           <a:p>
             <a:pPr lvl="1"/>
             <a:r>
-              <a:rPr lang="en-GB" dirty="0"/>
-              <a:t>n</a:t>
-            </a:r>
-            <a:r>
-              <a:rPr lang="en-AT" dirty="0"/>
-              <a:t>o android device</a:t>
-            </a:r>
+              <a:rPr lang="de-AT" dirty="0"/>
+              <a:t>Mobile </a:t>
+            </a:r>
+            <a:r>
+              <a:rPr lang="de-AT" dirty="0" err="1"/>
+              <a:t>device</a:t>
+            </a:r>
+            <a:endParaRPr lang="de-AT" dirty="0"/>
           </a:p>
           <a:p>
             <a:pPr lvl="1"/>
             <a:r>
-              <a:rPr lang="en-GB" dirty="0"/>
-              <a:t>e</a:t>
-            </a:r>
-            <a:r>
-              <a:rPr lang="en-AT" dirty="0"/>
-              <a:t>mulator and QR-codes</a:t>
+              <a:rPr lang="de-AT" dirty="0"/>
+              <a:t>Desktop</a:t>
+            </a:r>
+          </a:p>
+          <a:p>
+            <a:pPr lvl="2"/>
+            <a:r>
+              <a:rPr lang="de-AT" dirty="0" err="1"/>
+              <a:t>YubiKey</a:t>
+            </a:r>
+            <a:endParaRPr lang="de-AT" dirty="0"/>
+          </a:p>
+          <a:p>
+            <a:pPr marL="457200" lvl="1" indent="0">
+              <a:buNone/>
+            </a:pPr>
+            <a:endParaRPr lang="de-AT" dirty="0"/>
+          </a:p>
+          <a:p>
+            <a:r>
+              <a:rPr lang="de-AT" dirty="0" err="1"/>
+              <a:t>How</a:t>
+            </a:r>
+            <a:r>
+              <a:rPr lang="de-AT" dirty="0"/>
+              <a:t> </a:t>
+            </a:r>
+            <a:r>
+              <a:rPr lang="de-AT" dirty="0" err="1"/>
+              <a:t>to</a:t>
+            </a:r>
+            <a:r>
+              <a:rPr lang="de-AT" dirty="0"/>
+              <a:t> </a:t>
+            </a:r>
+            <a:r>
+              <a:rPr lang="de-AT" dirty="0" err="1"/>
+              <a:t>authenticate</a:t>
+            </a:r>
+            <a:r>
+              <a:rPr lang="de-AT" dirty="0"/>
+              <a:t>?</a:t>
             </a:r>
           </a:p>
           <a:p>
             <a:pPr lvl="1"/>
-            <a:endParaRPr lang="en-AT" dirty="0"/>
-          </a:p>
-          <a:p>
-            <a:r>
-              <a:rPr lang="en-GB" dirty="0"/>
-              <a:t>t</a:t>
-            </a:r>
-            <a:r>
-              <a:rPr lang="en-AT" dirty="0"/>
-              <a:t>echnical</a:t>
+            <a:r>
+              <a:rPr lang="de-AT" dirty="0"/>
+              <a:t>Username/Password</a:t>
             </a:r>
           </a:p>
           <a:p>
             <a:pPr lvl="1"/>
             <a:r>
-              <a:rPr lang="en-AT" dirty="0"/>
-              <a:t>StrongBox Keymaster (Android 9)</a:t>
-            </a:r>
+              <a:rPr lang="de-AT"/>
+              <a:t>OAuth</a:t>
+            </a:r>
+            <a:endParaRPr lang="de-AT" dirty="0"/>
           </a:p>
           <a:p>
             <a:pPr lvl="1"/>
+            <a:r>
+              <a:rPr lang="de-AT" dirty="0"/>
+              <a:t>Token</a:t>
+            </a:r>
             <a:endParaRPr lang="en-AT" dirty="0"/>
           </a:p>
         </p:txBody>
@@ -4675,6 +4819,13 @@
             <a:r>
               <a:rPr lang="en-AT" dirty="0"/>
               <a:t>Titan M (Google)</a:t>
+            </a:r>
+          </a:p>
+          <a:p>
+            <a:pPr lvl="2"/>
+            <a:r>
+              <a:rPr lang="en-AT" dirty="0"/>
+              <a:t>StrongBox Keymaster</a:t>
             </a:r>
           </a:p>
           <a:p>

</xml_diff>